<commit_message>
Introduce Simple Optimized Forecast
</commit_message>
<xml_diff>
--- a/How Chrome v142 broke single sign on/ssoSilentFailsWithChrome142.pptx
+++ b/How Chrome v142 broke single sign on/ssoSilentFailsWithChrome142.pptx
@@ -205,7 +205,7 @@
           <a:p>
             <a:fld id="{B12C53B5-B8CE-4228-9A59-D7589090FC71}" type="datetimeFigureOut">
               <a:rPr lang="en-US" smtClean="0"/>
-              <a:t>11/9/2025</a:t>
+              <a:t>11/30/2025</a:t>
             </a:fld>
             <a:endParaRPr lang="en-US"/>
           </a:p>
@@ -787,7 +787,7 @@
           <a:p>
             <a:fld id="{7CD50C77-02E3-4B73-99A8-8DCBAA1422AA}" type="datetimeFigureOut">
               <a:rPr lang="cs-CZ" smtClean="0"/>
-              <a:t>09.11.2025</a:t>
+              <a:t>30.11.2025</a:t>
             </a:fld>
             <a:endParaRPr lang="cs-CZ"/>
           </a:p>
@@ -985,7 +985,7 @@
           <a:p>
             <a:fld id="{7CD50C77-02E3-4B73-99A8-8DCBAA1422AA}" type="datetimeFigureOut">
               <a:rPr lang="cs-CZ" smtClean="0"/>
-              <a:t>09.11.2025</a:t>
+              <a:t>30.11.2025</a:t>
             </a:fld>
             <a:endParaRPr lang="cs-CZ"/>
           </a:p>
@@ -1193,7 +1193,7 @@
           <a:p>
             <a:fld id="{7CD50C77-02E3-4B73-99A8-8DCBAA1422AA}" type="datetimeFigureOut">
               <a:rPr lang="cs-CZ" smtClean="0"/>
-              <a:t>09.11.2025</a:t>
+              <a:t>30.11.2025</a:t>
             </a:fld>
             <a:endParaRPr lang="cs-CZ"/>
           </a:p>
@@ -1391,7 +1391,7 @@
           <a:p>
             <a:fld id="{7CD50C77-02E3-4B73-99A8-8DCBAA1422AA}" type="datetimeFigureOut">
               <a:rPr lang="cs-CZ" smtClean="0"/>
-              <a:t>09.11.2025</a:t>
+              <a:t>30.11.2025</a:t>
             </a:fld>
             <a:endParaRPr lang="cs-CZ"/>
           </a:p>
@@ -1666,7 +1666,7 @@
           <a:p>
             <a:fld id="{7CD50C77-02E3-4B73-99A8-8DCBAA1422AA}" type="datetimeFigureOut">
               <a:rPr lang="cs-CZ" smtClean="0"/>
-              <a:t>09.11.2025</a:t>
+              <a:t>30.11.2025</a:t>
             </a:fld>
             <a:endParaRPr lang="cs-CZ"/>
           </a:p>
@@ -1931,7 +1931,7 @@
           <a:p>
             <a:fld id="{7CD50C77-02E3-4B73-99A8-8DCBAA1422AA}" type="datetimeFigureOut">
               <a:rPr lang="cs-CZ" smtClean="0"/>
-              <a:t>09.11.2025</a:t>
+              <a:t>30.11.2025</a:t>
             </a:fld>
             <a:endParaRPr lang="cs-CZ"/>
           </a:p>
@@ -2343,7 +2343,7 @@
           <a:p>
             <a:fld id="{7CD50C77-02E3-4B73-99A8-8DCBAA1422AA}" type="datetimeFigureOut">
               <a:rPr lang="cs-CZ" smtClean="0"/>
-              <a:t>09.11.2025</a:t>
+              <a:t>30.11.2025</a:t>
             </a:fld>
             <a:endParaRPr lang="cs-CZ"/>
           </a:p>
@@ -2484,7 +2484,7 @@
           <a:p>
             <a:fld id="{7CD50C77-02E3-4B73-99A8-8DCBAA1422AA}" type="datetimeFigureOut">
               <a:rPr lang="cs-CZ" smtClean="0"/>
-              <a:t>09.11.2025</a:t>
+              <a:t>30.11.2025</a:t>
             </a:fld>
             <a:endParaRPr lang="cs-CZ"/>
           </a:p>
@@ -2597,7 +2597,7 @@
           <a:p>
             <a:fld id="{7CD50C77-02E3-4B73-99A8-8DCBAA1422AA}" type="datetimeFigureOut">
               <a:rPr lang="cs-CZ" smtClean="0"/>
-              <a:t>09.11.2025</a:t>
+              <a:t>30.11.2025</a:t>
             </a:fld>
             <a:endParaRPr lang="cs-CZ"/>
           </a:p>
@@ -2908,7 +2908,7 @@
           <a:p>
             <a:fld id="{7CD50C77-02E3-4B73-99A8-8DCBAA1422AA}" type="datetimeFigureOut">
               <a:rPr lang="cs-CZ" smtClean="0"/>
-              <a:t>09.11.2025</a:t>
+              <a:t>30.11.2025</a:t>
             </a:fld>
             <a:endParaRPr lang="cs-CZ"/>
           </a:p>
@@ -3196,7 +3196,7 @@
           <a:p>
             <a:fld id="{7CD50C77-02E3-4B73-99A8-8DCBAA1422AA}" type="datetimeFigureOut">
               <a:rPr lang="cs-CZ" smtClean="0"/>
-              <a:t>09.11.2025</a:t>
+              <a:t>30.11.2025</a:t>
             </a:fld>
             <a:endParaRPr lang="cs-CZ"/>
           </a:p>
@@ -3437,7 +3437,7 @@
           <a:p>
             <a:fld id="{7CD50C77-02E3-4B73-99A8-8DCBAA1422AA}" type="datetimeFigureOut">
               <a:rPr lang="cs-CZ" smtClean="0"/>
-              <a:t>09.11.2025</a:t>
+              <a:t>30.11.2025</a:t>
             </a:fld>
             <a:endParaRPr lang="cs-CZ"/>
           </a:p>
@@ -4067,6 +4067,15 @@
             <a:endParaRPr lang="en-US" dirty="0"/>
           </a:p>
           <a:p>
+            <a:endParaRPr lang="cs-CZ" dirty="0"/>
+          </a:p>
+          <a:p>
+            <a:endParaRPr lang="cs-CZ" dirty="0"/>
+          </a:p>
+          <a:p>
+            <a:endParaRPr lang="cs-CZ" dirty="0"/>
+          </a:p>
+          <a:p>
             <a:r>
               <a:rPr lang="en-US" dirty="0"/>
               <a:t>DEMO</a:t>
@@ -4074,6 +4083,36 @@
           </a:p>
         </p:txBody>
       </p:sp>
+      <p:pic>
+        <p:nvPicPr>
+          <p:cNvPr id="7" name="Picture 6">
+            <a:extLst>
+              <a:ext uri="{FF2B5EF4-FFF2-40B4-BE49-F238E27FC236}">
+                <a16:creationId xmlns:a16="http://schemas.microsoft.com/office/drawing/2014/main" id="{9DA502AE-53E2-7BC6-CBB1-F3980B963A44}"/>
+              </a:ext>
+            </a:extLst>
+          </p:cNvPr>
+          <p:cNvPicPr>
+            <a:picLocks noChangeAspect="1"/>
+          </p:cNvPicPr>
+          <p:nvPr/>
+        </p:nvPicPr>
+        <p:blipFill>
+          <a:blip r:embed="rId4"/>
+          <a:stretch>
+            <a:fillRect/>
+          </a:stretch>
+        </p:blipFill>
+        <p:spPr>
+          <a:xfrm>
+            <a:off x="838200" y="3531347"/>
+            <a:ext cx="7602389" cy="1381121"/>
+          </a:xfrm>
+          <a:prstGeom prst="rect">
+            <a:avLst/>
+          </a:prstGeom>
+        </p:spPr>
+      </p:pic>
     </p:spTree>
     <p:extLst>
       <p:ext uri="{BB962C8B-B14F-4D97-AF65-F5344CB8AC3E}">

</xml_diff>